<commit_message>
Just some refactoring and GUI. Tested for couple of RC constants and the scripts perform really well! Hysteresis needs to be tested as well.
</commit_message>
<xml_diff>
--- a/Docs/Typhoon model through time.pptx
+++ b/Docs/Typhoon model through time.pptx
@@ -23,6 +23,7 @@
     <p:sldId id="273" r:id="rId17"/>
     <p:sldId id="274" r:id="rId18"/>
     <p:sldId id="275" r:id="rId19"/>
+    <p:sldId id="276" r:id="rId20"/>
   </p:sldIdLst>
   <p:sldSz cx="12192000" cy="6858000"/>
   <p:notesSz cx="6858000" cy="9144000"/>
@@ -152,6 +153,7 @@
             <p14:sldId id="273"/>
             <p14:sldId id="274"/>
             <p14:sldId id="275"/>
+            <p14:sldId id="276"/>
           </p14:sldIdLst>
         </p14:section>
       </p14:sectionLst>
@@ -5157,6 +5159,101 @@
 </p:sld>
 </file>
 
+<file path=ppt/slides/slide19.xml><?xml version="1.0" encoding="utf-8"?>
+<p:sld xmlns:a="http://schemas.openxmlformats.org/drawingml/2006/main" xmlns:r="http://schemas.openxmlformats.org/officeDocument/2006/relationships" xmlns:p="http://schemas.openxmlformats.org/presentationml/2006/main">
+  <p:cSld>
+    <p:spTree>
+      <p:nvGrpSpPr>
+        <p:cNvPr id="1" name=""/>
+        <p:cNvGrpSpPr/>
+        <p:nvPr/>
+      </p:nvGrpSpPr>
+      <p:grpSpPr>
+        <a:xfrm>
+          <a:off x="0" y="0"/>
+          <a:ext cx="0" cy="0"/>
+          <a:chOff x="0" y="0"/>
+          <a:chExt cx="0" cy="0"/>
+        </a:xfrm>
+      </p:grpSpPr>
+      <p:sp>
+        <p:nvSpPr>
+          <p:cNvPr id="2" name="Title 1">
+            <a:extLst>
+              <a:ext uri="{FF2B5EF4-FFF2-40B4-BE49-F238E27FC236}">
+                <a16:creationId xmlns:a16="http://schemas.microsoft.com/office/drawing/2014/main" id="{AFAD8F48-C64C-22CA-1AD3-D17F065851F8}"/>
+              </a:ext>
+            </a:extLst>
+          </p:cNvPr>
+          <p:cNvSpPr>
+            <a:spLocks noGrp="1"/>
+          </p:cNvSpPr>
+          <p:nvPr>
+            <p:ph type="title"/>
+          </p:nvPr>
+        </p:nvSpPr>
+        <p:spPr/>
+        <p:txBody>
+          <a:bodyPr/>
+          <a:lstStyle/>
+          <a:p>
+            <a:r>
+              <a:rPr lang="en-US" dirty="0"/>
+              <a:t>11.11.2022. RC circuit testing (RC = 60, R = 4 </a:t>
+            </a:r>
+            <a:r>
+              <a:rPr lang="en-US" dirty="0" err="1"/>
+              <a:t>miliohm</a:t>
+            </a:r>
+            <a:r>
+              <a:rPr lang="en-US" dirty="0"/>
+              <a:t>)</a:t>
+            </a:r>
+          </a:p>
+        </p:txBody>
+      </p:sp>
+      <p:pic>
+        <p:nvPicPr>
+          <p:cNvPr id="7" name="Content Placeholder 6">
+            <a:extLst>
+              <a:ext uri="{FF2B5EF4-FFF2-40B4-BE49-F238E27FC236}">
+                <a16:creationId xmlns:a16="http://schemas.microsoft.com/office/drawing/2014/main" id="{9CC2A869-7606-0DB3-9A27-DD55CFAC2C74}"/>
+              </a:ext>
+            </a:extLst>
+          </p:cNvPr>
+          <p:cNvPicPr>
+            <a:picLocks noGrp="1" noChangeAspect="1"/>
+          </p:cNvPicPr>
+          <p:nvPr>
+            <p:ph idx="1"/>
+          </p:nvPr>
+        </p:nvPicPr>
+        <p:blipFill>
+          <a:blip r:embed="rId2"/>
+          <a:stretch>
+            <a:fillRect/>
+          </a:stretch>
+        </p:blipFill>
+        <p:spPr>
+          <a:xfrm>
+            <a:off x="838200" y="1923709"/>
+            <a:ext cx="10515600" cy="4155170"/>
+          </a:xfrm>
+        </p:spPr>
+      </p:pic>
+    </p:spTree>
+    <p:extLst>
+      <p:ext uri="{BB962C8B-B14F-4D97-AF65-F5344CB8AC3E}">
+        <p14:creationId xmlns:p14="http://schemas.microsoft.com/office/powerpoint/2010/main" val="1208573849"/>
+      </p:ext>
+    </p:extLst>
+  </p:cSld>
+  <p:clrMapOvr>
+    <a:masterClrMapping/>
+  </p:clrMapOvr>
+</p:sld>
+</file>
+
 <file path=ppt/slides/slide2.xml><?xml version="1.0" encoding="utf-8"?>
 <p:sld xmlns:a="http://schemas.openxmlformats.org/drawingml/2006/main" xmlns:r="http://schemas.openxmlformats.org/officeDocument/2006/relationships" xmlns:p="http://schemas.openxmlformats.org/presentationml/2006/main">
   <p:cSld>

</xml_diff>

<commit_message>
Added two alternatives to the SISOSubid function and thus two more methods of finding variables R0, R1 and C1 (RC). differential_evolution gives fantastic results but takes a little longer. Error is now lower than ever. Needs to be tested with hysteresis.
Otherwise, small reformatting in measure_error.py and model. measure_error.py is still not giving good results but that is secondary.
</commit_message>
<xml_diff>
--- a/Docs/Typhoon model through time.pptx
+++ b/Docs/Typhoon model through time.pptx
@@ -24,6 +24,7 @@
     <p:sldId id="274" r:id="rId18"/>
     <p:sldId id="275" r:id="rId19"/>
     <p:sldId id="276" r:id="rId20"/>
+    <p:sldId id="277" r:id="rId21"/>
   </p:sldIdLst>
   <p:sldSz cx="12192000" cy="6858000"/>
   <p:notesSz cx="6858000" cy="9144000"/>
@@ -154,6 +155,7 @@
             <p14:sldId id="274"/>
             <p14:sldId id="275"/>
             <p14:sldId id="276"/>
+            <p14:sldId id="277"/>
           </p14:sldIdLst>
         </p14:section>
       </p14:sectionLst>
@@ -312,7 +314,7 @@
           <a:p>
             <a:fld id="{3CCA50DD-E80F-4A10-8379-FAA7C52F806C}" type="datetimeFigureOut">
               <a:rPr lang="en-US" smtClean="0"/>
-              <a:t>11/11/2022</a:t>
+              <a:t>11/20/2022</a:t>
             </a:fld>
             <a:endParaRPr lang="en-US"/>
           </a:p>
@@ -510,7 +512,7 @@
           <a:p>
             <a:fld id="{3CCA50DD-E80F-4A10-8379-FAA7C52F806C}" type="datetimeFigureOut">
               <a:rPr lang="en-US" smtClean="0"/>
-              <a:t>11/11/2022</a:t>
+              <a:t>11/20/2022</a:t>
             </a:fld>
             <a:endParaRPr lang="en-US"/>
           </a:p>
@@ -718,7 +720,7 @@
           <a:p>
             <a:fld id="{3CCA50DD-E80F-4A10-8379-FAA7C52F806C}" type="datetimeFigureOut">
               <a:rPr lang="en-US" smtClean="0"/>
-              <a:t>11/11/2022</a:t>
+              <a:t>11/20/2022</a:t>
             </a:fld>
             <a:endParaRPr lang="en-US"/>
           </a:p>
@@ -916,7 +918,7 @@
           <a:p>
             <a:fld id="{3CCA50DD-E80F-4A10-8379-FAA7C52F806C}" type="datetimeFigureOut">
               <a:rPr lang="en-US" smtClean="0"/>
-              <a:t>11/11/2022</a:t>
+              <a:t>11/20/2022</a:t>
             </a:fld>
             <a:endParaRPr lang="en-US"/>
           </a:p>
@@ -1191,7 +1193,7 @@
           <a:p>
             <a:fld id="{3CCA50DD-E80F-4A10-8379-FAA7C52F806C}" type="datetimeFigureOut">
               <a:rPr lang="en-US" smtClean="0"/>
-              <a:t>11/11/2022</a:t>
+              <a:t>11/20/2022</a:t>
             </a:fld>
             <a:endParaRPr lang="en-US"/>
           </a:p>
@@ -1456,7 +1458,7 @@
           <a:p>
             <a:fld id="{3CCA50DD-E80F-4A10-8379-FAA7C52F806C}" type="datetimeFigureOut">
               <a:rPr lang="en-US" smtClean="0"/>
-              <a:t>11/11/2022</a:t>
+              <a:t>11/20/2022</a:t>
             </a:fld>
             <a:endParaRPr lang="en-US"/>
           </a:p>
@@ -1868,7 +1870,7 @@
           <a:p>
             <a:fld id="{3CCA50DD-E80F-4A10-8379-FAA7C52F806C}" type="datetimeFigureOut">
               <a:rPr lang="en-US" smtClean="0"/>
-              <a:t>11/11/2022</a:t>
+              <a:t>11/20/2022</a:t>
             </a:fld>
             <a:endParaRPr lang="en-US"/>
           </a:p>
@@ -2009,7 +2011,7 @@
           <a:p>
             <a:fld id="{3CCA50DD-E80F-4A10-8379-FAA7C52F806C}" type="datetimeFigureOut">
               <a:rPr lang="en-US" smtClean="0"/>
-              <a:t>11/11/2022</a:t>
+              <a:t>11/20/2022</a:t>
             </a:fld>
             <a:endParaRPr lang="en-US"/>
           </a:p>
@@ -2122,7 +2124,7 @@
           <a:p>
             <a:fld id="{3CCA50DD-E80F-4A10-8379-FAA7C52F806C}" type="datetimeFigureOut">
               <a:rPr lang="en-US" smtClean="0"/>
-              <a:t>11/11/2022</a:t>
+              <a:t>11/20/2022</a:t>
             </a:fld>
             <a:endParaRPr lang="en-US"/>
           </a:p>
@@ -2433,7 +2435,7 @@
           <a:p>
             <a:fld id="{3CCA50DD-E80F-4A10-8379-FAA7C52F806C}" type="datetimeFigureOut">
               <a:rPr lang="en-US" smtClean="0"/>
-              <a:t>11/11/2022</a:t>
+              <a:t>11/20/2022</a:t>
             </a:fld>
             <a:endParaRPr lang="en-US"/>
           </a:p>
@@ -2721,7 +2723,7 @@
           <a:p>
             <a:fld id="{3CCA50DD-E80F-4A10-8379-FAA7C52F806C}" type="datetimeFigureOut">
               <a:rPr lang="en-US" smtClean="0"/>
-              <a:t>11/11/2022</a:t>
+              <a:t>11/20/2022</a:t>
             </a:fld>
             <a:endParaRPr lang="en-US"/>
           </a:p>
@@ -2962,7 +2964,7 @@
           <a:p>
             <a:fld id="{3CCA50DD-E80F-4A10-8379-FAA7C52F806C}" type="datetimeFigureOut">
               <a:rPr lang="en-US" smtClean="0"/>
-              <a:t>11/11/2022</a:t>
+              <a:t>11/20/2022</a:t>
             </a:fld>
             <a:endParaRPr lang="en-US"/>
           </a:p>
@@ -5207,8 +5209,21 @@
             </a:r>
             <a:r>
               <a:rPr lang="en-US" dirty="0"/>
-              <a:t>)</a:t>
-            </a:r>
+              <a:t>) using </a:t>
+            </a:r>
+            <a:r>
+              <a:rPr lang="en-US" dirty="0" err="1">
+                <a:highlight>
+                  <a:srgbClr val="FFFF00"/>
+                </a:highlight>
+              </a:rPr>
+              <a:t>SISOSubid</a:t>
+            </a:r>
+            <a:endParaRPr lang="en-US" dirty="0">
+              <a:highlight>
+                <a:srgbClr val="FFFF00"/>
+              </a:highlight>
+            </a:endParaRPr>
           </a:p>
         </p:txBody>
       </p:sp>
@@ -5609,6 +5624,116 @@
     <p:extLst>
       <p:ext uri="{BB962C8B-B14F-4D97-AF65-F5344CB8AC3E}">
         <p14:creationId xmlns:p14="http://schemas.microsoft.com/office/powerpoint/2010/main" val="2788474431"/>
+      </p:ext>
+    </p:extLst>
+  </p:cSld>
+  <p:clrMapOvr>
+    <a:masterClrMapping/>
+  </p:clrMapOvr>
+</p:sld>
+</file>
+
+<file path=ppt/slides/slide20.xml><?xml version="1.0" encoding="utf-8"?>
+<p:sld xmlns:a="http://schemas.openxmlformats.org/drawingml/2006/main" xmlns:r="http://schemas.openxmlformats.org/officeDocument/2006/relationships" xmlns:p="http://schemas.openxmlformats.org/presentationml/2006/main">
+  <p:cSld>
+    <p:spTree>
+      <p:nvGrpSpPr>
+        <p:cNvPr id="1" name=""/>
+        <p:cNvGrpSpPr/>
+        <p:nvPr/>
+      </p:nvGrpSpPr>
+      <p:grpSpPr>
+        <a:xfrm>
+          <a:off x="0" y="0"/>
+          <a:ext cx="0" cy="0"/>
+          <a:chOff x="0" y="0"/>
+          <a:chExt cx="0" cy="0"/>
+        </a:xfrm>
+      </p:grpSpPr>
+      <p:sp>
+        <p:nvSpPr>
+          <p:cNvPr id="2" name="Title 1">
+            <a:extLst>
+              <a:ext uri="{FF2B5EF4-FFF2-40B4-BE49-F238E27FC236}">
+                <a16:creationId xmlns:a16="http://schemas.microsoft.com/office/drawing/2014/main" id="{AFAD8F48-C64C-22CA-1AD3-D17F065851F8}"/>
+              </a:ext>
+            </a:extLst>
+          </p:cNvPr>
+          <p:cNvSpPr>
+            <a:spLocks noGrp="1"/>
+          </p:cNvSpPr>
+          <p:nvPr>
+            <p:ph type="title"/>
+          </p:nvPr>
+        </p:nvSpPr>
+        <p:spPr/>
+        <p:txBody>
+          <a:bodyPr>
+            <a:normAutofit fontScale="90000"/>
+          </a:bodyPr>
+          <a:lstStyle/>
+          <a:p>
+            <a:r>
+              <a:rPr lang="en-US" dirty="0"/>
+              <a:t>20.11.2022. RC circuit testing (RC = 60, R = 4 </a:t>
+            </a:r>
+            <a:r>
+              <a:rPr lang="en-US" dirty="0" err="1"/>
+              <a:t>miliohm</a:t>
+            </a:r>
+            <a:r>
+              <a:rPr lang="en-US" dirty="0"/>
+              <a:t>), this time using </a:t>
+            </a:r>
+            <a:r>
+              <a:rPr lang="en-US" dirty="0" err="1">
+                <a:highlight>
+                  <a:srgbClr val="FFFF00"/>
+                </a:highlight>
+              </a:rPr>
+              <a:t>differential_evolution</a:t>
+            </a:r>
+            <a:endParaRPr lang="en-US" dirty="0">
+              <a:highlight>
+                <a:srgbClr val="FFFF00"/>
+              </a:highlight>
+            </a:endParaRPr>
+          </a:p>
+        </p:txBody>
+      </p:sp>
+      <p:pic>
+        <p:nvPicPr>
+          <p:cNvPr id="9" name="Content Placeholder 8">
+            <a:extLst>
+              <a:ext uri="{FF2B5EF4-FFF2-40B4-BE49-F238E27FC236}">
+                <a16:creationId xmlns:a16="http://schemas.microsoft.com/office/drawing/2014/main" id="{41C80583-F456-90E4-ABE1-0E4EBE10D86F}"/>
+              </a:ext>
+            </a:extLst>
+          </p:cNvPr>
+          <p:cNvPicPr>
+            <a:picLocks noGrp="1" noChangeAspect="1"/>
+          </p:cNvPicPr>
+          <p:nvPr>
+            <p:ph idx="1"/>
+          </p:nvPr>
+        </p:nvPicPr>
+        <p:blipFill>
+          <a:blip r:embed="rId2"/>
+          <a:stretch>
+            <a:fillRect/>
+          </a:stretch>
+        </p:blipFill>
+        <p:spPr>
+          <a:xfrm>
+            <a:off x="838200" y="2281882"/>
+            <a:ext cx="10515600" cy="3438823"/>
+          </a:xfrm>
+        </p:spPr>
+      </p:pic>
+    </p:spTree>
+    <p:extLst>
+      <p:ext uri="{BB962C8B-B14F-4D97-AF65-F5344CB8AC3E}">
+        <p14:creationId xmlns:p14="http://schemas.microsoft.com/office/powerpoint/2010/main" val="410707182"/>
       </p:ext>
     </p:extLst>
   </p:cSld>

</xml_diff>

<commit_message>
Reformatting. Hysteresis remains unresolved.
</commit_message>
<xml_diff>
--- a/Docs/Typhoon model through time.pptx
+++ b/Docs/Typhoon model through time.pptx
@@ -320,7 +320,7 @@
           <a:p>
             <a:fld id="{3CCA50DD-E80F-4A10-8379-FAA7C52F806C}" type="datetimeFigureOut">
               <a:rPr lang="en-US" smtClean="0"/>
-              <a:t>11/26/2022</a:t>
+              <a:t>11/27/2022</a:t>
             </a:fld>
             <a:endParaRPr lang="en-US"/>
           </a:p>
@@ -518,7 +518,7 @@
           <a:p>
             <a:fld id="{3CCA50DD-E80F-4A10-8379-FAA7C52F806C}" type="datetimeFigureOut">
               <a:rPr lang="en-US" smtClean="0"/>
-              <a:t>11/26/2022</a:t>
+              <a:t>11/27/2022</a:t>
             </a:fld>
             <a:endParaRPr lang="en-US"/>
           </a:p>
@@ -726,7 +726,7 @@
           <a:p>
             <a:fld id="{3CCA50DD-E80F-4A10-8379-FAA7C52F806C}" type="datetimeFigureOut">
               <a:rPr lang="en-US" smtClean="0"/>
-              <a:t>11/26/2022</a:t>
+              <a:t>11/27/2022</a:t>
             </a:fld>
             <a:endParaRPr lang="en-US"/>
           </a:p>
@@ -924,7 +924,7 @@
           <a:p>
             <a:fld id="{3CCA50DD-E80F-4A10-8379-FAA7C52F806C}" type="datetimeFigureOut">
               <a:rPr lang="en-US" smtClean="0"/>
-              <a:t>11/26/2022</a:t>
+              <a:t>11/27/2022</a:t>
             </a:fld>
             <a:endParaRPr lang="en-US"/>
           </a:p>
@@ -1199,7 +1199,7 @@
           <a:p>
             <a:fld id="{3CCA50DD-E80F-4A10-8379-FAA7C52F806C}" type="datetimeFigureOut">
               <a:rPr lang="en-US" smtClean="0"/>
-              <a:t>11/26/2022</a:t>
+              <a:t>11/27/2022</a:t>
             </a:fld>
             <a:endParaRPr lang="en-US"/>
           </a:p>
@@ -1464,7 +1464,7 @@
           <a:p>
             <a:fld id="{3CCA50DD-E80F-4A10-8379-FAA7C52F806C}" type="datetimeFigureOut">
               <a:rPr lang="en-US" smtClean="0"/>
-              <a:t>11/26/2022</a:t>
+              <a:t>11/27/2022</a:t>
             </a:fld>
             <a:endParaRPr lang="en-US"/>
           </a:p>
@@ -1876,7 +1876,7 @@
           <a:p>
             <a:fld id="{3CCA50DD-E80F-4A10-8379-FAA7C52F806C}" type="datetimeFigureOut">
               <a:rPr lang="en-US" smtClean="0"/>
-              <a:t>11/26/2022</a:t>
+              <a:t>11/27/2022</a:t>
             </a:fld>
             <a:endParaRPr lang="en-US"/>
           </a:p>
@@ -2017,7 +2017,7 @@
           <a:p>
             <a:fld id="{3CCA50DD-E80F-4A10-8379-FAA7C52F806C}" type="datetimeFigureOut">
               <a:rPr lang="en-US" smtClean="0"/>
-              <a:t>11/26/2022</a:t>
+              <a:t>11/27/2022</a:t>
             </a:fld>
             <a:endParaRPr lang="en-US"/>
           </a:p>
@@ -2130,7 +2130,7 @@
           <a:p>
             <a:fld id="{3CCA50DD-E80F-4A10-8379-FAA7C52F806C}" type="datetimeFigureOut">
               <a:rPr lang="en-US" smtClean="0"/>
-              <a:t>11/26/2022</a:t>
+              <a:t>11/27/2022</a:t>
             </a:fld>
             <a:endParaRPr lang="en-US"/>
           </a:p>
@@ -2441,7 +2441,7 @@
           <a:p>
             <a:fld id="{3CCA50DD-E80F-4A10-8379-FAA7C52F806C}" type="datetimeFigureOut">
               <a:rPr lang="en-US" smtClean="0"/>
-              <a:t>11/26/2022</a:t>
+              <a:t>11/27/2022</a:t>
             </a:fld>
             <a:endParaRPr lang="en-US"/>
           </a:p>
@@ -2729,7 +2729,7 @@
           <a:p>
             <a:fld id="{3CCA50DD-E80F-4A10-8379-FAA7C52F806C}" type="datetimeFigureOut">
               <a:rPr lang="en-US" smtClean="0"/>
-              <a:t>11/26/2022</a:t>
+              <a:t>11/27/2022</a:t>
             </a:fld>
             <a:endParaRPr lang="en-US"/>
           </a:p>
@@ -2970,7 +2970,7 @@
           <a:p>
             <a:fld id="{3CCA50DD-E80F-4A10-8379-FAA7C52F806C}" type="datetimeFigureOut">
               <a:rPr lang="en-US" smtClean="0"/>
-              <a:t>11/26/2022</a:t>
+              <a:t>11/27/2022</a:t>
             </a:fld>
             <a:endParaRPr lang="en-US"/>
           </a:p>
@@ -5801,6 +5801,12 @@
               </a:rPr>
               <a:t>Same data, </a:t>
             </a:r>
+            <a:br>
+              <a:rPr lang="en-US" sz="2400" dirty="0">
+                <a:latin typeface="Arial" panose="020B0604020202020204" pitchFamily="34" charset="0"/>
+                <a:cs typeface="Arial" panose="020B0604020202020204" pitchFamily="34" charset="0"/>
+              </a:rPr>
+            </a:br>
             <a:r>
               <a:rPr lang="en-US" sz="2400" dirty="0">
                 <a:highlight>
@@ -5818,6 +5824,29 @@
               </a:rPr>
               <a:t> vs </a:t>
             </a:r>
+            <a:br>
+              <a:rPr lang="en-US" sz="2400" dirty="0">
+                <a:latin typeface="Arial" panose="020B0604020202020204" pitchFamily="34" charset="0"/>
+                <a:cs typeface="Arial" panose="020B0604020202020204" pitchFamily="34" charset="0"/>
+              </a:rPr>
+            </a:br>
+            <a:r>
+              <a:rPr lang="en-US" sz="2400" dirty="0">
+                <a:highlight>
+                  <a:srgbClr val="FFFF00"/>
+                </a:highlight>
+                <a:latin typeface="Arial" panose="020B0604020202020204" pitchFamily="34" charset="0"/>
+                <a:cs typeface="Arial" panose="020B0604020202020204" pitchFamily="34" charset="0"/>
+              </a:rPr>
+              <a:t>Powell minimize</a:t>
+            </a:r>
+            <a:r>
+              <a:rPr lang="en-US" sz="2400" dirty="0">
+                <a:latin typeface="Arial" panose="020B0604020202020204" pitchFamily="34" charset="0"/>
+                <a:cs typeface="Arial" panose="020B0604020202020204" pitchFamily="34" charset="0"/>
+              </a:rPr>
+              <a:t> and </a:t>
+            </a:r>
             <a:r>
               <a:rPr lang="en-US" sz="2400" dirty="0" err="1">
                 <a:highlight>
@@ -5830,12 +5859,15 @@
             </a:r>
             <a:r>
               <a:rPr lang="en-US" sz="2400" dirty="0">
+                <a:highlight>
+                  <a:srgbClr val="FFFF00"/>
+                </a:highlight>
                 <a:latin typeface="Arial" panose="020B0604020202020204" pitchFamily="34" charset="0"/>
                 <a:cs typeface="Arial" panose="020B0604020202020204" pitchFamily="34" charset="0"/>
               </a:rPr>
-              <a:t>. Both much better than </a:t>
-            </a:r>
-            <a:r>
+              <a:t> </a:t>
+            </a:r>
+            <a:br>
               <a:rPr lang="en-US" sz="2400" dirty="0">
                 <a:highlight>
                   <a:srgbClr val="FFFF00"/>
@@ -5843,26 +5875,30 @@
                 <a:latin typeface="Arial" panose="020B0604020202020204" pitchFamily="34" charset="0"/>
                 <a:cs typeface="Arial" panose="020B0604020202020204" pitchFamily="34" charset="0"/>
               </a:rPr>
-              <a:t>minimize</a:t>
+            </a:br>
+            <a:r>
+              <a:rPr lang="en-US" sz="2400" dirty="0">
+                <a:latin typeface="Arial" panose="020B0604020202020204" pitchFamily="34" charset="0"/>
+                <a:cs typeface="Arial" panose="020B0604020202020204" pitchFamily="34" charset="0"/>
+              </a:rPr>
+              <a:t>give great and similar results</a:t>
             </a:r>
           </a:p>
         </p:txBody>
       </p:sp>
       <p:pic>
         <p:nvPicPr>
-          <p:cNvPr id="7" name="Content Placeholder 6">
-            <a:extLst>
-              <a:ext uri="{FF2B5EF4-FFF2-40B4-BE49-F238E27FC236}">
-                <a16:creationId xmlns:a16="http://schemas.microsoft.com/office/drawing/2014/main" id="{96083267-B4C0-81EF-4937-DB7CAF180A0A}"/>
+          <p:cNvPr id="8" name="Content Placeholder 4">
+            <a:extLst>
+              <a:ext uri="{FF2B5EF4-FFF2-40B4-BE49-F238E27FC236}">
+                <a16:creationId xmlns:a16="http://schemas.microsoft.com/office/drawing/2014/main" id="{6A366BE7-6AAC-CE46-C199-FA567BAFFD14}"/>
               </a:ext>
             </a:extLst>
           </p:cNvPr>
           <p:cNvPicPr>
-            <a:picLocks noGrp="1" noChangeAspect="1"/>
+            <a:picLocks noChangeAspect="1"/>
           </p:cNvPicPr>
-          <p:nvPr>
-            <p:ph idx="1"/>
-          </p:nvPr>
+          <p:nvPr/>
         </p:nvPicPr>
         <p:blipFill>
           <a:blip r:embed="rId2"/>
@@ -5872,24 +5908,29 @@
         </p:blipFill>
         <p:spPr>
           <a:xfrm>
-            <a:off x="706315" y="3429000"/>
-            <a:ext cx="6898252" cy="2497643"/>
+            <a:off x="767861" y="-1152845"/>
+            <a:ext cx="6898252" cy="2788215"/>
           </a:xfrm>
+          <a:prstGeom prst="rect">
+            <a:avLst/>
+          </a:prstGeom>
         </p:spPr>
       </p:pic>
       <p:pic>
         <p:nvPicPr>
-          <p:cNvPr id="8" name="Content Placeholder 4">
-            <a:extLst>
-              <a:ext uri="{FF2B5EF4-FFF2-40B4-BE49-F238E27FC236}">
-                <a16:creationId xmlns:a16="http://schemas.microsoft.com/office/drawing/2014/main" id="{6A366BE7-6AAC-CE46-C199-FA567BAFFD14}"/>
+          <p:cNvPr id="10" name="Content Placeholder 9">
+            <a:extLst>
+              <a:ext uri="{FF2B5EF4-FFF2-40B4-BE49-F238E27FC236}">
+                <a16:creationId xmlns:a16="http://schemas.microsoft.com/office/drawing/2014/main" id="{645CB91E-359C-0ED1-FEDC-343BD27E3914}"/>
               </a:ext>
             </a:extLst>
           </p:cNvPr>
           <p:cNvPicPr>
-            <a:picLocks noChangeAspect="1"/>
+            <a:picLocks noGrp="1" noChangeAspect="1"/>
           </p:cNvPicPr>
-          <p:nvPr/>
+          <p:nvPr>
+            <p:ph idx="1"/>
+          </p:nvPr>
         </p:nvPicPr>
         <p:blipFill>
           <a:blip r:embed="rId3"/>
@@ -5899,8 +5940,35 @@
         </p:blipFill>
         <p:spPr>
           <a:xfrm>
-            <a:off x="706315" y="640785"/>
-            <a:ext cx="6898252" cy="2788215"/>
+            <a:off x="767861" y="1635370"/>
+            <a:ext cx="6898252" cy="2901461"/>
+          </a:xfrm>
+        </p:spPr>
+      </p:pic>
+      <p:pic>
+        <p:nvPicPr>
+          <p:cNvPr id="13" name="Picture 12">
+            <a:extLst>
+              <a:ext uri="{FF2B5EF4-FFF2-40B4-BE49-F238E27FC236}">
+                <a16:creationId xmlns:a16="http://schemas.microsoft.com/office/drawing/2014/main" id="{84CCC6E5-FCEA-285A-0385-5F95ECA4F339}"/>
+              </a:ext>
+            </a:extLst>
+          </p:cNvPr>
+          <p:cNvPicPr>
+            <a:picLocks noChangeAspect="1"/>
+          </p:cNvPicPr>
+          <p:nvPr/>
+        </p:nvPicPr>
+        <p:blipFill>
+          <a:blip r:embed="rId4"/>
+          <a:stretch>
+            <a:fillRect/>
+          </a:stretch>
+        </p:blipFill>
+        <p:spPr>
+          <a:xfrm>
+            <a:off x="744676" y="4536831"/>
+            <a:ext cx="6921438" cy="2323665"/>
           </a:xfrm>
           <a:prstGeom prst="rect">
             <a:avLst/>

</xml_diff>